<commit_message>
update rule and slides
</commit_message>
<xml_diff>
--- a/doc/week2.pptx
+++ b/doc/week2.pptx
@@ -5311,49 +5311,73 @@
             <a:spLocks noGrp="1"/>
           </p:cNvSpPr>
           <p:nvPr>
-            <p:ph idx="1"/>
-          </p:nvPr>
-        </p:nvSpPr>
-        <p:spPr>
-          <a:xfrm>
-            <a:off x="838200" y="1879600"/>
-            <a:ext cx="10515600" cy="4297363"/>
-          </a:xfrm>
-        </p:spPr>
+            <p:ph sz="half" idx="1"/>
+          </p:nvPr>
+        </p:nvSpPr>
+        <p:spPr/>
         <p:txBody>
           <a:bodyPr>
-            <a:normAutofit fontScale="92500" lnSpcReduction="10000"/>
+            <a:normAutofit/>
           </a:bodyPr>
           <a:lstStyle/>
           <a:p>
+            <a:pPr>
+              <a:lnSpc>
+                <a:spcPct val="160000"/>
+              </a:lnSpc>
+            </a:pPr>
             <a:r>
               <a:rPr lang="en-US" sz="2800" dirty="0"/>
               <a:t>Infeasible to Encode </a:t>
             </a:r>
           </a:p>
           <a:p>
-            <a:pPr lvl="1"/>
+            <a:pPr lvl="1">
+              <a:lnSpc>
+                <a:spcPct val="160000"/>
+              </a:lnSpc>
+              <a:buFont typeface="Courier New" panose="02070309020205020404" pitchFamily="49" charset="0"/>
+              <a:buChar char="o"/>
+            </a:pPr>
             <a:r>
               <a:rPr lang="en-US" dirty="0"/>
               <a:t>Dynamic Behavior </a:t>
             </a:r>
           </a:p>
           <a:p>
-            <a:pPr lvl="1"/>
+            <a:pPr lvl="1">
+              <a:lnSpc>
+                <a:spcPct val="160000"/>
+              </a:lnSpc>
+              <a:buFont typeface="Courier New" panose="02070309020205020404" pitchFamily="49" charset="0"/>
+              <a:buChar char="o"/>
+            </a:pPr>
             <a:r>
               <a:rPr lang="en-US" dirty="0"/>
               <a:t>Graphic Design</a:t>
             </a:r>
           </a:p>
           <a:p>
-            <a:pPr lvl="1"/>
+            <a:pPr lvl="1">
+              <a:lnSpc>
+                <a:spcPct val="160000"/>
+              </a:lnSpc>
+              <a:buFont typeface="Courier New" panose="02070309020205020404" pitchFamily="49" charset="0"/>
+              <a:buChar char="o"/>
+            </a:pPr>
             <a:r>
               <a:rPr lang="en-US" dirty="0"/>
               <a:t>Description and Suggestion</a:t>
             </a:r>
           </a:p>
           <a:p>
-            <a:pPr lvl="1"/>
+            <a:pPr lvl="1">
+              <a:lnSpc>
+                <a:spcPct val="160000"/>
+              </a:lnSpc>
+              <a:buFont typeface="Courier New" panose="02070309020205020404" pitchFamily="49" charset="0"/>
+              <a:buChar char="o"/>
+            </a:pPr>
             <a:r>
               <a:rPr lang="en-US" dirty="0"/>
               <a:t>Rough </a:t>
@@ -5364,17 +5388,54 @@
             </a:r>
           </a:p>
           <a:p>
-            <a:pPr lvl="1"/>
+            <a:pPr lvl="1">
+              <a:lnSpc>
+                <a:spcPct val="160000"/>
+              </a:lnSpc>
+            </a:pPr>
             <a:endParaRPr lang="en-US" altLang="zh-CN" sz="2400" dirty="0"/>
           </a:p>
-          <a:p>
-            <a:r>
-              <a:rPr lang="en-US" sz="2800" dirty="0"/>
+        </p:txBody>
+      </p:sp>
+      <p:sp>
+        <p:nvSpPr>
+          <p:cNvPr id="7" name="Content Placeholder 6">
+            <a:extLst>
+              <a:ext uri="{FF2B5EF4-FFF2-40B4-BE49-F238E27FC236}">
+                <a16:creationId xmlns:a16="http://schemas.microsoft.com/office/drawing/2014/main" id="{FBD4A6F1-5BB3-4CD4-AB56-D65C5D7A0E01}"/>
+              </a:ext>
+            </a:extLst>
+          </p:cNvPr>
+          <p:cNvSpPr>
+            <a:spLocks noGrp="1"/>
+          </p:cNvSpPr>
+          <p:nvPr>
+            <p:ph sz="half" idx="2"/>
+          </p:nvPr>
+        </p:nvSpPr>
+        <p:spPr/>
+        <p:txBody>
+          <a:bodyPr/>
+          <a:lstStyle/>
+          <a:p>
+            <a:pPr>
+              <a:lnSpc>
+                <a:spcPct val="160000"/>
+              </a:lnSpc>
+            </a:pPr>
+            <a:r>
+              <a:rPr lang="en-US" dirty="0"/>
               <a:t>Hard to Implement </a:t>
             </a:r>
           </a:p>
           <a:p>
-            <a:pPr lvl="1"/>
+            <a:pPr lvl="1">
+              <a:lnSpc>
+                <a:spcPct val="160000"/>
+              </a:lnSpc>
+              <a:buFont typeface="Courier New" panose="02070309020205020404" pitchFamily="49" charset="0"/>
+              <a:buChar char="o"/>
+            </a:pPr>
             <a:r>
               <a:rPr lang="en-US" altLang="zh-CN" dirty="0"/>
               <a:t>Systematical Rule </a:t>
@@ -5382,18 +5443,32 @@
           </a:p>
           <a:p>
             <a:pPr marL="457200" lvl="1" indent="0">
+              <a:lnSpc>
+                <a:spcPct val="160000"/>
+              </a:lnSpc>
               <a:buNone/>
             </a:pPr>
-            <a:endParaRPr lang="en-US" sz="2400" dirty="0"/>
-          </a:p>
-          <a:p>
-            <a:r>
-              <a:rPr lang="en-US" sz="2800" dirty="0"/>
+            <a:endParaRPr lang="en-US" dirty="0"/>
+          </a:p>
+          <a:p>
+            <a:pPr>
+              <a:lnSpc>
+                <a:spcPct val="160000"/>
+              </a:lnSpc>
+            </a:pPr>
+            <a:r>
+              <a:rPr lang="en-US" dirty="0"/>
               <a:t>Implementable </a:t>
             </a:r>
           </a:p>
           <a:p>
-            <a:pPr lvl="1"/>
+            <a:pPr lvl="1">
+              <a:lnSpc>
+                <a:spcPct val="160000"/>
+              </a:lnSpc>
+              <a:buFont typeface="Courier New" panose="02070309020205020404" pitchFamily="49" charset="0"/>
+              <a:buChar char="o"/>
+            </a:pPr>
             <a:r>
               <a:rPr lang="en-US" altLang="zh-CN" dirty="0"/>
               <a:t>Quantitative</a:t>
@@ -5402,6 +5477,9 @@
               <a:rPr lang="en-US" dirty="0"/>
               <a:t> Rule </a:t>
             </a:r>
+          </a:p>
+          <a:p>
+            <a:endParaRPr lang="en-US" dirty="0"/>
           </a:p>
         </p:txBody>
       </p:sp>
@@ -5639,7 +5717,7 @@
         </p:nvSpPr>
         <p:spPr>
           <a:xfrm>
-            <a:off x="838200" y="1792937"/>
+            <a:off x="838200" y="1731434"/>
             <a:ext cx="3622040" cy="4384026"/>
           </a:xfrm>
         </p:spPr>
@@ -6022,10 +6100,10 @@
       </p:sp>
       <p:pic>
         <p:nvPicPr>
-          <p:cNvPr id="4" name="Picture 3">
-            <a:extLst>
-              <a:ext uri="{FF2B5EF4-FFF2-40B4-BE49-F238E27FC236}">
-                <a16:creationId xmlns:a16="http://schemas.microsoft.com/office/drawing/2014/main" id="{6C3C1A00-1CC3-4705-A9BE-45FCF79FC335}"/>
+          <p:cNvPr id="6" name="Picture 5">
+            <a:extLst>
+              <a:ext uri="{FF2B5EF4-FFF2-40B4-BE49-F238E27FC236}">
+                <a16:creationId xmlns:a16="http://schemas.microsoft.com/office/drawing/2014/main" id="{F63D296E-2740-4EBE-BF4E-990D5EB22025}"/>
               </a:ext>
             </a:extLst>
           </p:cNvPr>
@@ -6036,36 +6114,6 @@
         </p:nvPicPr>
         <p:blipFill>
           <a:blip r:embed="rId2"/>
-          <a:stretch>
-            <a:fillRect/>
-          </a:stretch>
-        </p:blipFill>
-        <p:spPr>
-          <a:xfrm>
-            <a:off x="3321501" y="3749040"/>
-            <a:ext cx="2368680" cy="2902846"/>
-          </a:xfrm>
-          <a:prstGeom prst="rect">
-            <a:avLst/>
-          </a:prstGeom>
-        </p:spPr>
-      </p:pic>
-      <p:pic>
-        <p:nvPicPr>
-          <p:cNvPr id="6" name="Picture 5">
-            <a:extLst>
-              <a:ext uri="{FF2B5EF4-FFF2-40B4-BE49-F238E27FC236}">
-                <a16:creationId xmlns:a16="http://schemas.microsoft.com/office/drawing/2014/main" id="{F63D296E-2740-4EBE-BF4E-990D5EB22025}"/>
-              </a:ext>
-            </a:extLst>
-          </p:cNvPr>
-          <p:cNvPicPr>
-            <a:picLocks noChangeAspect="1"/>
-          </p:cNvPicPr>
-          <p:nvPr/>
-        </p:nvPicPr>
-        <p:blipFill>
-          <a:blip r:embed="rId3"/>
           <a:stretch>
             <a:fillRect/>
           </a:stretch>
@@ -6095,7 +6143,7 @@
           <p:nvPr/>
         </p:nvPicPr>
         <p:blipFill>
-          <a:blip r:embed="rId4"/>
+          <a:blip r:embed="rId3"/>
           <a:stretch>
             <a:fillRect/>
           </a:stretch>
@@ -6104,6 +6152,36 @@
           <a:xfrm>
             <a:off x="5961868" y="3664019"/>
             <a:ext cx="5132852" cy="2987867"/>
+          </a:xfrm>
+          <a:prstGeom prst="rect">
+            <a:avLst/>
+          </a:prstGeom>
+        </p:spPr>
+      </p:pic>
+      <p:pic>
+        <p:nvPicPr>
+          <p:cNvPr id="5" name="Picture 4">
+            <a:extLst>
+              <a:ext uri="{FF2B5EF4-FFF2-40B4-BE49-F238E27FC236}">
+                <a16:creationId xmlns:a16="http://schemas.microsoft.com/office/drawing/2014/main" id="{5C38EA6B-6068-4E02-B8AB-E98859E324CB}"/>
+              </a:ext>
+            </a:extLst>
+          </p:cNvPr>
+          <p:cNvPicPr>
+            <a:picLocks noChangeAspect="1"/>
+          </p:cNvPicPr>
+          <p:nvPr/>
+        </p:nvPicPr>
+        <p:blipFill>
+          <a:blip r:embed="rId4"/>
+          <a:stretch>
+            <a:fillRect/>
+          </a:stretch>
+        </p:blipFill>
+        <p:spPr>
+          <a:xfrm>
+            <a:off x="765493" y="3429000"/>
+            <a:ext cx="4638040" cy="2628743"/>
           </a:xfrm>
           <a:prstGeom prst="rect">
             <a:avLst/>

</xml_diff>